<commit_message>
feat: Add presentation slides for validation, RAG report, and pipeline overview
- Add Agent 4 DB validation slide (COSMIC/OncoKB/WGS integration)
- Add Agent 6 LLM report slide (RAG interpretation + safeguards)
- Add unified report structure slide (Bulk + Single-cell sections)
- Add TOC slide, troubleshooting slide (ML data leakage)
- Add combined pipeline slide (Bulk + Single-cell 6-Agent)
- Update CLAUDE.md tagline
- Rename report sections for clarity (QC, Gene Candidate Validation)
- Update v2 pipeline slides for 6-Agent structure

🤖 Generated with [Claude Code](https://claude.com/claude-code)

Co-Authored-By: Claude <noreply@anthropic.com>
</commit_message>
<xml_diff>
--- a/workspace/pptx_slides/v2_pipeline/BioInsight_Pipeline.pptx
+++ b/workspace/pptx_slides/v2_pipeline/BioInsight_Pipeline.pptx
@@ -2981,7 +2981,7 @@
                 <a:ea typeface="Arial" pitchFamily="34" charset="-122"/>
                 <a:cs typeface="Arial" pitchFamily="34" charset="-120"/>
               </a:rPr>
-              <a:t>Bulk: 2-Step Process</a:t>
+              <a:t>Bulk RNA-seq: 6-Agent Pipeline</a:t>
             </a:r>
             <a:endParaRPr lang="en-US" sz="1200" dirty="0"/>
           </a:p>
@@ -3020,7 +3020,7 @@
                 <a:ea typeface="Arial" pitchFamily="34" charset="-122"/>
                 <a:cs typeface="Arial" pitchFamily="34" charset="-120"/>
               </a:rPr>
-              <a:t>Step 1: DEG Analysis, Step 2: Interpretation</a:t>
+              <a:t>DEG → Network → Pathway → Validation → Viz → Report</a:t>
             </a:r>
             <a:endParaRPr lang="en-US" sz="900" dirty="0"/>
           </a:p>
@@ -3094,7 +3094,7 @@
                 <a:ea typeface="Arial" pitchFamily="34" charset="-122"/>
                 <a:cs typeface="Arial" pitchFamily="34" charset="-120"/>
               </a:rPr>
-              <a:t>Single-cell: 1-Step Process</a:t>
+              <a:t>Single-cell: Scanpy Pipeline</a:t>
             </a:r>
             <a:endParaRPr lang="en-US" sz="1200" dirty="0"/>
           </a:p>
@@ -3133,7 +3133,7 @@
                 <a:ea typeface="Arial" pitchFamily="34" charset="-122"/>
                 <a:cs typeface="Arial" pitchFamily="34" charset="-120"/>
               </a:rPr>
-              <a:t>QC - Clustering - Annotation - Report</a:t>
+              <a:t>QC → Clustering → Annotation → Markers → Report</a:t>
             </a:r>
             <a:endParaRPr lang="en-US" sz="900" dirty="0"/>
           </a:p>
@@ -7865,7 +7865,7 @@
                 <a:ea typeface="Arial" pitchFamily="34" charset="-122"/>
                 <a:cs typeface="Arial" pitchFamily="34" charset="-120"/>
               </a:rPr>
-              <a:t>Single-cell Pipeline (1-Step)</a:t>
+              <a:t>Single-cell RNA-seq Pipeline</a:t>
             </a:r>
             <a:endParaRPr lang="en-US" sz="2600" dirty="0"/>
           </a:p>

</xml_diff>